<commit_message>
Update Regul Temp / Debugging LCD screen and test of Follower
</commit_message>
<xml_diff>
--- a/embedded_electronics/Regul_Temp_L432KC/Regul_Temp_L432KC_doc.pptx
+++ b/embedded_electronics/Regul_Temp_L432KC/Regul_Temp_L432KC_doc.pptx
@@ -198,7 +198,7 @@
           <a:p>
             <a:fld id="{A63A71F6-3B49-4358-957E-A92BEFE4DD94}" type="datetimeFigureOut">
               <a:rPr lang="fr-FR" smtClean="0"/>
-              <a:t>26/05/2025</a:t>
+              <a:t>03/06/2025</a:t>
             </a:fld>
             <a:endParaRPr lang="fr-FR"/>
           </a:p>
@@ -882,7 +882,7 @@
           <a:p>
             <a:fld id="{9F9D7BD0-09ED-4241-9B50-84DC221E5746}" type="datetimeFigureOut">
               <a:rPr lang="fr-FR" smtClean="0"/>
-              <a:t>26/05/2025</a:t>
+              <a:t>03/06/2025</a:t>
             </a:fld>
             <a:endParaRPr lang="fr-FR"/>
           </a:p>
@@ -1080,7 +1080,7 @@
           <a:p>
             <a:fld id="{9F9D7BD0-09ED-4241-9B50-84DC221E5746}" type="datetimeFigureOut">
               <a:rPr lang="fr-FR" smtClean="0"/>
-              <a:t>26/05/2025</a:t>
+              <a:t>03/06/2025</a:t>
             </a:fld>
             <a:endParaRPr lang="fr-FR"/>
           </a:p>
@@ -1288,7 +1288,7 @@
           <a:p>
             <a:fld id="{9F9D7BD0-09ED-4241-9B50-84DC221E5746}" type="datetimeFigureOut">
               <a:rPr lang="fr-FR" smtClean="0"/>
-              <a:t>26/05/2025</a:t>
+              <a:t>03/06/2025</a:t>
             </a:fld>
             <a:endParaRPr lang="fr-FR"/>
           </a:p>
@@ -1486,7 +1486,7 @@
           <a:p>
             <a:fld id="{9F9D7BD0-09ED-4241-9B50-84DC221E5746}" type="datetimeFigureOut">
               <a:rPr lang="fr-FR" smtClean="0"/>
-              <a:t>26/05/2025</a:t>
+              <a:t>03/06/2025</a:t>
             </a:fld>
             <a:endParaRPr lang="fr-FR"/>
           </a:p>
@@ -1761,7 +1761,7 @@
           <a:p>
             <a:fld id="{9F9D7BD0-09ED-4241-9B50-84DC221E5746}" type="datetimeFigureOut">
               <a:rPr lang="fr-FR" smtClean="0"/>
-              <a:t>26/05/2025</a:t>
+              <a:t>03/06/2025</a:t>
             </a:fld>
             <a:endParaRPr lang="fr-FR"/>
           </a:p>
@@ -2026,7 +2026,7 @@
           <a:p>
             <a:fld id="{9F9D7BD0-09ED-4241-9B50-84DC221E5746}" type="datetimeFigureOut">
               <a:rPr lang="fr-FR" smtClean="0"/>
-              <a:t>26/05/2025</a:t>
+              <a:t>03/06/2025</a:t>
             </a:fld>
             <a:endParaRPr lang="fr-FR"/>
           </a:p>
@@ -2438,7 +2438,7 @@
           <a:p>
             <a:fld id="{9F9D7BD0-09ED-4241-9B50-84DC221E5746}" type="datetimeFigureOut">
               <a:rPr lang="fr-FR" smtClean="0"/>
-              <a:t>26/05/2025</a:t>
+              <a:t>03/06/2025</a:t>
             </a:fld>
             <a:endParaRPr lang="fr-FR"/>
           </a:p>
@@ -2579,7 +2579,7 @@
           <a:p>
             <a:fld id="{9F9D7BD0-09ED-4241-9B50-84DC221E5746}" type="datetimeFigureOut">
               <a:rPr lang="fr-FR" smtClean="0"/>
-              <a:t>26/05/2025</a:t>
+              <a:t>03/06/2025</a:t>
             </a:fld>
             <a:endParaRPr lang="fr-FR"/>
           </a:p>
@@ -2692,7 +2692,7 @@
           <a:p>
             <a:fld id="{9F9D7BD0-09ED-4241-9B50-84DC221E5746}" type="datetimeFigureOut">
               <a:rPr lang="fr-FR" smtClean="0"/>
-              <a:t>26/05/2025</a:t>
+              <a:t>03/06/2025</a:t>
             </a:fld>
             <a:endParaRPr lang="fr-FR"/>
           </a:p>
@@ -3003,7 +3003,7 @@
           <a:p>
             <a:fld id="{9F9D7BD0-09ED-4241-9B50-84DC221E5746}" type="datetimeFigureOut">
               <a:rPr lang="fr-FR" smtClean="0"/>
-              <a:t>26/05/2025</a:t>
+              <a:t>03/06/2025</a:t>
             </a:fld>
             <a:endParaRPr lang="fr-FR"/>
           </a:p>
@@ -3291,7 +3291,7 @@
           <a:p>
             <a:fld id="{9F9D7BD0-09ED-4241-9B50-84DC221E5746}" type="datetimeFigureOut">
               <a:rPr lang="fr-FR" smtClean="0"/>
-              <a:t>26/05/2025</a:t>
+              <a:t>03/06/2025</a:t>
             </a:fld>
             <a:endParaRPr lang="fr-FR"/>
           </a:p>
@@ -3532,7 +3532,7 @@
           <a:p>
             <a:fld id="{9F9D7BD0-09ED-4241-9B50-84DC221E5746}" type="datetimeFigureOut">
               <a:rPr lang="fr-FR" smtClean="0"/>
-              <a:t>26/05/2025</a:t>
+              <a:t>03/06/2025</a:t>
             </a:fld>
             <a:endParaRPr lang="fr-FR"/>
           </a:p>
@@ -7507,6 +7507,55 @@
           </a:p>
         </p:txBody>
       </p:sp>
+      <p:sp>
+        <p:nvSpPr>
+          <p:cNvPr id="6" name="Rectangle 5">
+            <a:extLst>
+              <a:ext uri="{FF2B5EF4-FFF2-40B4-BE49-F238E27FC236}">
+                <a16:creationId xmlns:a16="http://schemas.microsoft.com/office/drawing/2014/main" id="{3CC8FE23-5898-C16A-5F07-2471856663F8}"/>
+              </a:ext>
+            </a:extLst>
+          </p:cNvPr>
+          <p:cNvSpPr/>
+          <p:nvPr/>
+        </p:nvSpPr>
+        <p:spPr>
+          <a:xfrm>
+            <a:off x="3352974" y="6361863"/>
+            <a:ext cx="7296172" cy="371495"/>
+          </a:xfrm>
+          <a:prstGeom prst="rect">
+            <a:avLst/>
+          </a:prstGeom>
+        </p:spPr>
+        <p:style>
+          <a:lnRef idx="2">
+            <a:schemeClr val="accent1">
+              <a:shade val="15000"/>
+            </a:schemeClr>
+          </a:lnRef>
+          <a:fillRef idx="1">
+            <a:schemeClr val="accent1"/>
+          </a:fillRef>
+          <a:effectRef idx="0">
+            <a:schemeClr val="accent1"/>
+          </a:effectRef>
+          <a:fontRef idx="minor">
+            <a:schemeClr val="lt1"/>
+          </a:fontRef>
+        </p:style>
+        <p:txBody>
+          <a:bodyPr rtlCol="0" anchor="ctr"/>
+          <a:lstStyle/>
+          <a:p>
+            <a:pPr algn="ctr"/>
+            <a:r>
+              <a:rPr lang="fr-FR" dirty="0"/>
+              <a:t>Attention : SB16 et SB18 doivent être retirés sur les cartes L432KC</a:t>
+            </a:r>
+          </a:p>
+        </p:txBody>
+      </p:sp>
     </p:spTree>
     <p:extLst>
       <p:ext uri="{BB962C8B-B14F-4D97-AF65-F5344CB8AC3E}">
@@ -9687,7 +9736,7 @@
                 <a:latin typeface="Calibri"/>
                 <a:ea typeface="DejaVu Sans"/>
               </a:rPr>
-              <a:t>PA_2</a:t>
+              <a:t>PA_2*</a:t>
             </a:r>
             <a:endParaRPr lang="fr-FR" sz="1200" b="0" strike="noStrike" spc="-1" dirty="0">
               <a:latin typeface="Arial"/>
@@ -9825,11 +9874,135 @@
                 <a:latin typeface="Calibri"/>
                 <a:ea typeface="DejaVu Sans"/>
               </a:rPr>
-              <a:t>Horloge</a:t>
+              <a:t>Horloge**</a:t>
             </a:r>
             <a:endParaRPr lang="fr-FR" sz="1200" b="0" strike="noStrike" spc="-1" dirty="0">
               <a:latin typeface="Arial"/>
             </a:endParaRPr>
+          </a:p>
+        </p:txBody>
+      </p:sp>
+      <p:sp>
+        <p:nvSpPr>
+          <p:cNvPr id="5" name="ZoneTexte 4">
+            <a:extLst>
+              <a:ext uri="{FF2B5EF4-FFF2-40B4-BE49-F238E27FC236}">
+                <a16:creationId xmlns:a16="http://schemas.microsoft.com/office/drawing/2014/main" id="{FBD8EE40-8E71-D8F1-A5F1-26DB891972B0}"/>
+              </a:ext>
+            </a:extLst>
+          </p:cNvPr>
+          <p:cNvSpPr txBox="1"/>
+          <p:nvPr/>
+        </p:nvSpPr>
+        <p:spPr>
+          <a:xfrm>
+            <a:off x="6855173" y="5272221"/>
+            <a:ext cx="3022253" cy="276999"/>
+          </a:xfrm>
+          <a:prstGeom prst="rect">
+            <a:avLst/>
+          </a:prstGeom>
+          <a:noFill/>
+        </p:spPr>
+        <p:txBody>
+          <a:bodyPr wrap="square" rtlCol="0">
+            <a:spAutoFit/>
+          </a:bodyPr>
+          <a:lstStyle/>
+          <a:p>
+            <a:r>
+              <a:rPr lang="fr-FR" sz="1200" i="1" dirty="0"/>
+              <a:t>* Non utilisable sur L432KC !!</a:t>
+            </a:r>
+          </a:p>
+        </p:txBody>
+      </p:sp>
+      <p:sp>
+        <p:nvSpPr>
+          <p:cNvPr id="8" name="ZoneTexte 7">
+            <a:extLst>
+              <a:ext uri="{FF2B5EF4-FFF2-40B4-BE49-F238E27FC236}">
+                <a16:creationId xmlns:a16="http://schemas.microsoft.com/office/drawing/2014/main" id="{C548D6B4-0ACE-24A0-7B52-6C70C88517D2}"/>
+              </a:ext>
+            </a:extLst>
+          </p:cNvPr>
+          <p:cNvSpPr txBox="1"/>
+          <p:nvPr/>
+        </p:nvSpPr>
+        <p:spPr>
+          <a:xfrm>
+            <a:off x="6855173" y="5563144"/>
+            <a:ext cx="3022253" cy="276999"/>
+          </a:xfrm>
+          <a:prstGeom prst="rect">
+            <a:avLst/>
+          </a:prstGeom>
+          <a:noFill/>
+        </p:spPr>
+        <p:txBody>
+          <a:bodyPr wrap="square" rtlCol="0">
+            <a:spAutoFit/>
+          </a:bodyPr>
+          <a:lstStyle/>
+          <a:p>
+            <a:r>
+              <a:rPr lang="fr-FR" sz="1200" i="1" dirty="0"/>
+              <a:t>** </a:t>
+            </a:r>
+            <a:r>
+              <a:rPr lang="fr-FR" sz="1200" i="1"/>
+              <a:t>Non connectée</a:t>
+            </a:r>
+            <a:endParaRPr lang="fr-FR" sz="1200" i="1" dirty="0"/>
+          </a:p>
+        </p:txBody>
+      </p:sp>
+      <p:sp>
+        <p:nvSpPr>
+          <p:cNvPr id="11" name="Rectangle 10">
+            <a:extLst>
+              <a:ext uri="{FF2B5EF4-FFF2-40B4-BE49-F238E27FC236}">
+                <a16:creationId xmlns:a16="http://schemas.microsoft.com/office/drawing/2014/main" id="{39F47A50-4291-AE7F-6F92-63C192289549}"/>
+              </a:ext>
+            </a:extLst>
+          </p:cNvPr>
+          <p:cNvSpPr/>
+          <p:nvPr/>
+        </p:nvSpPr>
+        <p:spPr>
+          <a:xfrm>
+            <a:off x="3352974" y="6361863"/>
+            <a:ext cx="7296172" cy="371495"/>
+          </a:xfrm>
+          <a:prstGeom prst="rect">
+            <a:avLst/>
+          </a:prstGeom>
+        </p:spPr>
+        <p:style>
+          <a:lnRef idx="2">
+            <a:schemeClr val="accent1">
+              <a:shade val="15000"/>
+            </a:schemeClr>
+          </a:lnRef>
+          <a:fillRef idx="1">
+            <a:schemeClr val="accent1"/>
+          </a:fillRef>
+          <a:effectRef idx="0">
+            <a:schemeClr val="accent1"/>
+          </a:effectRef>
+          <a:fontRef idx="minor">
+            <a:schemeClr val="lt1"/>
+          </a:fontRef>
+        </p:style>
+        <p:txBody>
+          <a:bodyPr rtlCol="0" anchor="ctr"/>
+          <a:lstStyle/>
+          <a:p>
+            <a:pPr algn="ctr"/>
+            <a:r>
+              <a:rPr lang="fr-FR" dirty="0"/>
+              <a:t>Attention : SB16 et SB18 doivent être retirés sur les cartes L432KC</a:t>
+            </a:r>
           </a:p>
         </p:txBody>
       </p:sp>

</xml_diff>